<commit_message>
updated p2, GPL license removed - not compatible with copyrighted material in p2
</commit_message>
<xml_diff>
--- a/part2.pptx
+++ b/part2.pptx
@@ -61,6 +61,13 @@
     <p:sldId id="310" r:id="rId55"/>
     <p:sldId id="311" r:id="rId56"/>
     <p:sldId id="312" r:id="rId57"/>
+    <p:sldId id="313" r:id="rId58"/>
+    <p:sldId id="314" r:id="rId59"/>
+    <p:sldId id="315" r:id="rId60"/>
+    <p:sldId id="316" r:id="rId61"/>
+    <p:sldId id="317" r:id="rId62"/>
+    <p:sldId id="318" r:id="rId63"/>
+    <p:sldId id="319" r:id="rId64"/>
   </p:sldIdLst>
   <p:sldSz cx="12192000" cy="6858000"/>
   <p:notesSz cx="6858000" cy="9144000"/>
@@ -165,6 +172,385 @@
     </p:ext>
   </p:extLst>
 </p:presentation>
+</file>
+
+<file path=ppt/revisionInfo.xml><?xml version="1.0" encoding="utf-8"?>
+<p1510:revInfo xmlns:a="http://schemas.openxmlformats.org/drawingml/2006/main" xmlns:r="http://schemas.openxmlformats.org/officeDocument/2006/relationships" xmlns:p1510="http://schemas.microsoft.com/office/powerpoint/2015/10/main">
+  <p1510:revLst>
+    <p1510:client id="{CD4EFC38-E4C9-4F8B-9A88-2D53C40DDBF0}" v="27" dt="2019-10-03T23:00:57.343"/>
+  </p1510:revLst>
+</p1510:revInfo>
+</file>
+
+<file path=ppt/changesInfos/changesInfo1.xml><?xml version="1.0" encoding="utf-8"?>
+<pc:chgInfo xmlns:a="http://schemas.openxmlformats.org/drawingml/2006/main" xmlns:r="http://schemas.openxmlformats.org/officeDocument/2006/relationships" xmlns:ac="http://schemas.microsoft.com/office/drawing/2013/main/command" xmlns:pc="http://schemas.microsoft.com/office/powerpoint/2013/main/command">
+  <pc:docChgLst>
+    <pc:chgData name="Sergey Parshin" userId="33371af5f60a0596" providerId="LiveId" clId="{CD4EFC38-E4C9-4F8B-9A88-2D53C40DDBF0}"/>
+    <pc:docChg chg="undo custSel addSld delSld modSld">
+      <pc:chgData name="Sergey Parshin" userId="33371af5f60a0596" providerId="LiveId" clId="{CD4EFC38-E4C9-4F8B-9A88-2D53C40DDBF0}" dt="2019-10-03T23:01:10.611" v="1550" actId="404"/>
+      <pc:docMkLst>
+        <pc:docMk/>
+      </pc:docMkLst>
+      <pc:sldChg chg="modSp">
+        <pc:chgData name="Sergey Parshin" userId="33371af5f60a0596" providerId="LiveId" clId="{CD4EFC38-E4C9-4F8B-9A88-2D53C40DDBF0}" dt="2019-10-03T22:26:36.882" v="665" actId="20577"/>
+        <pc:sldMkLst>
+          <pc:docMk/>
+          <pc:sldMk cId="1397394201" sldId="311"/>
+        </pc:sldMkLst>
+        <pc:spChg chg="mod">
+          <ac:chgData name="Sergey Parshin" userId="33371af5f60a0596" providerId="LiveId" clId="{CD4EFC38-E4C9-4F8B-9A88-2D53C40DDBF0}" dt="2019-10-03T22:26:36.882" v="665" actId="20577"/>
+          <ac:spMkLst>
+            <pc:docMk/>
+            <pc:sldMk cId="1397394201" sldId="311"/>
+            <ac:spMk id="3" creationId="{36FA157A-D60C-4AC6-9E30-F3EB5F40D6D3}"/>
+          </ac:spMkLst>
+        </pc:spChg>
+      </pc:sldChg>
+      <pc:sldChg chg="addSp delSp modSp">
+        <pc:chgData name="Sergey Parshin" userId="33371af5f60a0596" providerId="LiveId" clId="{CD4EFC38-E4C9-4F8B-9A88-2D53C40DDBF0}" dt="2019-10-03T22:27:25.438" v="726" actId="14100"/>
+        <pc:sldMkLst>
+          <pc:docMk/>
+          <pc:sldMk cId="602141131" sldId="312"/>
+        </pc:sldMkLst>
+        <pc:spChg chg="mod">
+          <ac:chgData name="Sergey Parshin" userId="33371af5f60a0596" providerId="LiveId" clId="{CD4EFC38-E4C9-4F8B-9A88-2D53C40DDBF0}" dt="2019-10-03T22:27:10.568" v="722" actId="20577"/>
+          <ac:spMkLst>
+            <pc:docMk/>
+            <pc:sldMk cId="602141131" sldId="312"/>
+            <ac:spMk id="2" creationId="{3340CABF-5241-4665-950E-902AC1D2FAEE}"/>
+          </ac:spMkLst>
+        </pc:spChg>
+        <pc:spChg chg="del mod">
+          <ac:chgData name="Sergey Parshin" userId="33371af5f60a0596" providerId="LiveId" clId="{CD4EFC38-E4C9-4F8B-9A88-2D53C40DDBF0}" dt="2019-10-03T22:27:17.030" v="723" actId="478"/>
+          <ac:spMkLst>
+            <pc:docMk/>
+            <pc:sldMk cId="602141131" sldId="312"/>
+            <ac:spMk id="3" creationId="{36FA157A-D60C-4AC6-9E30-F3EB5F40D6D3}"/>
+          </ac:spMkLst>
+        </pc:spChg>
+        <pc:spChg chg="add del mod">
+          <ac:chgData name="Sergey Parshin" userId="33371af5f60a0596" providerId="LiveId" clId="{CD4EFC38-E4C9-4F8B-9A88-2D53C40DDBF0}" dt="2019-10-03T22:27:20.229" v="724" actId="478"/>
+          <ac:spMkLst>
+            <pc:docMk/>
+            <pc:sldMk cId="602141131" sldId="312"/>
+            <ac:spMk id="6" creationId="{5DF52401-3EAE-4A42-A146-98ABF13F739B}"/>
+          </ac:spMkLst>
+        </pc:spChg>
+        <pc:picChg chg="mod">
+          <ac:chgData name="Sergey Parshin" userId="33371af5f60a0596" providerId="LiveId" clId="{CD4EFC38-E4C9-4F8B-9A88-2D53C40DDBF0}" dt="2019-10-03T22:27:25.438" v="726" actId="14100"/>
+          <ac:picMkLst>
+            <pc:docMk/>
+            <pc:sldMk cId="602141131" sldId="312"/>
+            <ac:picMk id="5" creationId="{92331335-08D8-46CA-896D-D83EB4889401}"/>
+          </ac:picMkLst>
+        </pc:picChg>
+      </pc:sldChg>
+      <pc:sldChg chg="addSp delSp modSp">
+        <pc:chgData name="Sergey Parshin" userId="33371af5f60a0596" providerId="LiveId" clId="{CD4EFC38-E4C9-4F8B-9A88-2D53C40DDBF0}" dt="2019-10-03T22:36:51.262" v="1171" actId="167"/>
+        <pc:sldMkLst>
+          <pc:docMk/>
+          <pc:sldMk cId="4075998874" sldId="313"/>
+        </pc:sldMkLst>
+        <pc:spChg chg="mod">
+          <ac:chgData name="Sergey Parshin" userId="33371af5f60a0596" providerId="LiveId" clId="{CD4EFC38-E4C9-4F8B-9A88-2D53C40DDBF0}" dt="2019-10-03T22:27:35.054" v="745" actId="20577"/>
+          <ac:spMkLst>
+            <pc:docMk/>
+            <pc:sldMk cId="4075998874" sldId="313"/>
+            <ac:spMk id="2" creationId="{3340CABF-5241-4665-950E-902AC1D2FAEE}"/>
+          </ac:spMkLst>
+        </pc:spChg>
+        <pc:spChg chg="mod">
+          <ac:chgData name="Sergey Parshin" userId="33371af5f60a0596" providerId="LiveId" clId="{CD4EFC38-E4C9-4F8B-9A88-2D53C40DDBF0}" dt="2019-10-03T22:36:28.644" v="1169" actId="27636"/>
+          <ac:spMkLst>
+            <pc:docMk/>
+            <pc:sldMk cId="4075998874" sldId="313"/>
+            <ac:spMk id="3" creationId="{36FA157A-D60C-4AC6-9E30-F3EB5F40D6D3}"/>
+          </ac:spMkLst>
+        </pc:spChg>
+        <pc:spChg chg="add del mod">
+          <ac:chgData name="Sergey Parshin" userId="33371af5f60a0596" providerId="LiveId" clId="{CD4EFC38-E4C9-4F8B-9A88-2D53C40DDBF0}" dt="2019-10-03T22:23:07.545" v="367" actId="478"/>
+          <ac:spMkLst>
+            <pc:docMk/>
+            <pc:sldMk cId="4075998874" sldId="313"/>
+            <ac:spMk id="4" creationId="{BC51F177-36DB-4509-9D21-9ADB67BC2573}"/>
+          </ac:spMkLst>
+        </pc:spChg>
+        <pc:spChg chg="add mod">
+          <ac:chgData name="Sergey Parshin" userId="33371af5f60a0596" providerId="LiveId" clId="{CD4EFC38-E4C9-4F8B-9A88-2D53C40DDBF0}" dt="2019-10-03T22:36:22.658" v="1167" actId="1076"/>
+          <ac:spMkLst>
+            <pc:docMk/>
+            <pc:sldMk cId="4075998874" sldId="313"/>
+            <ac:spMk id="6" creationId="{AC4F6529-251C-4262-901D-9FC7E0019B8A}"/>
+          </ac:spMkLst>
+        </pc:spChg>
+        <pc:picChg chg="add mod ord">
+          <ac:chgData name="Sergey Parshin" userId="33371af5f60a0596" providerId="LiveId" clId="{CD4EFC38-E4C9-4F8B-9A88-2D53C40DDBF0}" dt="2019-10-03T22:36:51.262" v="1171" actId="167"/>
+          <ac:picMkLst>
+            <pc:docMk/>
+            <pc:sldMk cId="4075998874" sldId="313"/>
+            <ac:picMk id="5" creationId="{7016AF2E-63E1-4BAE-9C31-30CBDAF7BC37}"/>
+          </ac:picMkLst>
+        </pc:picChg>
+      </pc:sldChg>
+      <pc:sldChg chg="addSp delSp modSp add">
+        <pc:chgData name="Sergey Parshin" userId="33371af5f60a0596" providerId="LiveId" clId="{CD4EFC38-E4C9-4F8B-9A88-2D53C40DDBF0}" dt="2019-10-03T22:37:19.025" v="1184" actId="6549"/>
+        <pc:sldMkLst>
+          <pc:docMk/>
+          <pc:sldMk cId="3376517106" sldId="314"/>
+        </pc:sldMkLst>
+        <pc:spChg chg="mod">
+          <ac:chgData name="Sergey Parshin" userId="33371af5f60a0596" providerId="LiveId" clId="{CD4EFC38-E4C9-4F8B-9A88-2D53C40DDBF0}" dt="2019-10-03T22:32:19.862" v="1056" actId="20577"/>
+          <ac:spMkLst>
+            <pc:docMk/>
+            <pc:sldMk cId="3376517106" sldId="314"/>
+            <ac:spMk id="2" creationId="{3340CABF-5241-4665-950E-902AC1D2FAEE}"/>
+          </ac:spMkLst>
+        </pc:spChg>
+        <pc:spChg chg="del">
+          <ac:chgData name="Sergey Parshin" userId="33371af5f60a0596" providerId="LiveId" clId="{CD4EFC38-E4C9-4F8B-9A88-2D53C40DDBF0}" dt="2019-10-03T22:18:27.437" v="333" actId="478"/>
+          <ac:spMkLst>
+            <pc:docMk/>
+            <pc:sldMk cId="3376517106" sldId="314"/>
+            <ac:spMk id="3" creationId="{36FA157A-D60C-4AC6-9E30-F3EB5F40D6D3}"/>
+          </ac:spMkLst>
+        </pc:spChg>
+        <pc:spChg chg="mod">
+          <ac:chgData name="Sergey Parshin" userId="33371af5f60a0596" providerId="LiveId" clId="{CD4EFC38-E4C9-4F8B-9A88-2D53C40DDBF0}" dt="2019-10-03T22:37:19.025" v="1184" actId="6549"/>
+          <ac:spMkLst>
+            <pc:docMk/>
+            <pc:sldMk cId="3376517106" sldId="314"/>
+            <ac:spMk id="4" creationId="{BC51F177-36DB-4509-9D21-9ADB67BC2573}"/>
+          </ac:spMkLst>
+        </pc:spChg>
+        <pc:spChg chg="add del mod">
+          <ac:chgData name="Sergey Parshin" userId="33371af5f60a0596" providerId="LiveId" clId="{CD4EFC38-E4C9-4F8B-9A88-2D53C40DDBF0}" dt="2019-10-03T22:18:29.656" v="334" actId="478"/>
+          <ac:spMkLst>
+            <pc:docMk/>
+            <pc:sldMk cId="3376517106" sldId="314"/>
+            <ac:spMk id="6" creationId="{ACCA4981-C6A5-4202-B47C-8E4B9C4B45F7}"/>
+          </ac:spMkLst>
+        </pc:spChg>
+        <pc:picChg chg="add del mod ord">
+          <ac:chgData name="Sergey Parshin" userId="33371af5f60a0596" providerId="LiveId" clId="{CD4EFC38-E4C9-4F8B-9A88-2D53C40DDBF0}" dt="2019-10-03T22:32:23.022" v="1057" actId="478"/>
+          <ac:picMkLst>
+            <pc:docMk/>
+            <pc:sldMk cId="3376517106" sldId="314"/>
+            <ac:picMk id="7" creationId="{1675D2FA-770D-43A4-9EC7-C54235098BDF}"/>
+          </ac:picMkLst>
+        </pc:picChg>
+        <pc:picChg chg="add mod ord">
+          <ac:chgData name="Sergey Parshin" userId="33371af5f60a0596" providerId="LiveId" clId="{CD4EFC38-E4C9-4F8B-9A88-2D53C40DDBF0}" dt="2019-10-03T22:32:32.367" v="1094" actId="1038"/>
+          <ac:picMkLst>
+            <pc:docMk/>
+            <pc:sldMk cId="3376517106" sldId="314"/>
+            <ac:picMk id="8" creationId="{88757E61-16B7-4676-9C0E-CEEA22402B1B}"/>
+          </ac:picMkLst>
+        </pc:picChg>
+      </pc:sldChg>
+      <pc:sldChg chg="modSp add">
+        <pc:chgData name="Sergey Parshin" userId="33371af5f60a0596" providerId="LiveId" clId="{CD4EFC38-E4C9-4F8B-9A88-2D53C40DDBF0}" dt="2019-10-03T22:34:53.619" v="1153" actId="1038"/>
+        <pc:sldMkLst>
+          <pc:docMk/>
+          <pc:sldMk cId="4233348570" sldId="315"/>
+        </pc:sldMkLst>
+        <pc:picChg chg="mod">
+          <ac:chgData name="Sergey Parshin" userId="33371af5f60a0596" providerId="LiveId" clId="{CD4EFC38-E4C9-4F8B-9A88-2D53C40DDBF0}" dt="2019-10-03T22:34:53.619" v="1153" actId="1038"/>
+          <ac:picMkLst>
+            <pc:docMk/>
+            <pc:sldMk cId="4233348570" sldId="315"/>
+            <ac:picMk id="7" creationId="{1675D2FA-770D-43A4-9EC7-C54235098BDF}"/>
+          </ac:picMkLst>
+        </pc:picChg>
+      </pc:sldChg>
+      <pc:sldChg chg="addSp delSp modSp add">
+        <pc:chgData name="Sergey Parshin" userId="33371af5f60a0596" providerId="LiveId" clId="{CD4EFC38-E4C9-4F8B-9A88-2D53C40DDBF0}" dt="2019-10-03T22:34:30.947" v="1140" actId="1038"/>
+        <pc:sldMkLst>
+          <pc:docMk/>
+          <pc:sldMk cId="1778258312" sldId="316"/>
+        </pc:sldMkLst>
+        <pc:spChg chg="mod">
+          <ac:chgData name="Sergey Parshin" userId="33371af5f60a0596" providerId="LiveId" clId="{CD4EFC38-E4C9-4F8B-9A88-2D53C40DDBF0}" dt="2019-10-03T22:33:47.717" v="1096" actId="20577"/>
+          <ac:spMkLst>
+            <pc:docMk/>
+            <pc:sldMk cId="1778258312" sldId="316"/>
+            <ac:spMk id="2" creationId="{3340CABF-5241-4665-950E-902AC1D2FAEE}"/>
+          </ac:spMkLst>
+        </pc:spChg>
+        <pc:picChg chg="add mod ord">
+          <ac:chgData name="Sergey Parshin" userId="33371af5f60a0596" providerId="LiveId" clId="{CD4EFC38-E4C9-4F8B-9A88-2D53C40DDBF0}" dt="2019-10-03T22:34:30.947" v="1140" actId="1038"/>
+          <ac:picMkLst>
+            <pc:docMk/>
+            <pc:sldMk cId="1778258312" sldId="316"/>
+            <ac:picMk id="3" creationId="{293B1A1E-3D30-423C-8E70-3EA68DA5D868}"/>
+          </ac:picMkLst>
+        </pc:picChg>
+        <pc:picChg chg="del">
+          <ac:chgData name="Sergey Parshin" userId="33371af5f60a0596" providerId="LiveId" clId="{CD4EFC38-E4C9-4F8B-9A88-2D53C40DDBF0}" dt="2019-10-03T22:33:50.627" v="1097" actId="478"/>
+          <ac:picMkLst>
+            <pc:docMk/>
+            <pc:sldMk cId="1778258312" sldId="316"/>
+            <ac:picMk id="7" creationId="{1675D2FA-770D-43A4-9EC7-C54235098BDF}"/>
+          </ac:picMkLst>
+        </pc:picChg>
+      </pc:sldChg>
+      <pc:sldChg chg="addSp delSp modSp add">
+        <pc:chgData name="Sergey Parshin" userId="33371af5f60a0596" providerId="LiveId" clId="{CD4EFC38-E4C9-4F8B-9A88-2D53C40DDBF0}" dt="2019-10-03T22:40:16.556" v="1227" actId="14100"/>
+        <pc:sldMkLst>
+          <pc:docMk/>
+          <pc:sldMk cId="236119335" sldId="317"/>
+        </pc:sldMkLst>
+        <pc:spChg chg="mod">
+          <ac:chgData name="Sergey Parshin" userId="33371af5f60a0596" providerId="LiveId" clId="{CD4EFC38-E4C9-4F8B-9A88-2D53C40DDBF0}" dt="2019-10-03T22:39:30.973" v="1218" actId="20577"/>
+          <ac:spMkLst>
+            <pc:docMk/>
+            <pc:sldMk cId="236119335" sldId="317"/>
+            <ac:spMk id="2" creationId="{0F5E4F47-9DA8-4CCF-805C-3F7A13EEE530}"/>
+          </ac:spMkLst>
+        </pc:spChg>
+        <pc:spChg chg="del">
+          <ac:chgData name="Sergey Parshin" userId="33371af5f60a0596" providerId="LiveId" clId="{CD4EFC38-E4C9-4F8B-9A88-2D53C40DDBF0}" dt="2019-10-03T22:39:08.602" v="1186" actId="478"/>
+          <ac:spMkLst>
+            <pc:docMk/>
+            <pc:sldMk cId="236119335" sldId="317"/>
+            <ac:spMk id="3" creationId="{B2D9E6DA-6F0A-43B7-9018-E5CF1213C38C}"/>
+          </ac:spMkLst>
+        </pc:spChg>
+        <pc:spChg chg="add mod">
+          <ac:chgData name="Sergey Parshin" userId="33371af5f60a0596" providerId="LiveId" clId="{CD4EFC38-E4C9-4F8B-9A88-2D53C40DDBF0}" dt="2019-10-03T22:39:47.197" v="1222" actId="1076"/>
+          <ac:spMkLst>
+            <pc:docMk/>
+            <pc:sldMk cId="236119335" sldId="317"/>
+            <ac:spMk id="5" creationId="{C4935C57-9BCF-4CDC-A3AA-07CC3FB0EABB}"/>
+          </ac:spMkLst>
+        </pc:spChg>
+        <pc:spChg chg="add mod">
+          <ac:chgData name="Sergey Parshin" userId="33371af5f60a0596" providerId="LiveId" clId="{CD4EFC38-E4C9-4F8B-9A88-2D53C40DDBF0}" dt="2019-10-03T22:40:16.556" v="1227" actId="14100"/>
+          <ac:spMkLst>
+            <pc:docMk/>
+            <pc:sldMk cId="236119335" sldId="317"/>
+            <ac:spMk id="6" creationId="{FE80234E-1EF0-4E41-9784-676EBD57FED6}"/>
+          </ac:spMkLst>
+        </pc:spChg>
+        <pc:picChg chg="add mod">
+          <ac:chgData name="Sergey Parshin" userId="33371af5f60a0596" providerId="LiveId" clId="{CD4EFC38-E4C9-4F8B-9A88-2D53C40DDBF0}" dt="2019-10-03T22:39:36.459" v="1219" actId="1076"/>
+          <ac:picMkLst>
+            <pc:docMk/>
+            <pc:sldMk cId="236119335" sldId="317"/>
+            <ac:picMk id="4" creationId="{1DEA422D-F1AD-4F8C-90E4-E9172F170641}"/>
+          </ac:picMkLst>
+        </pc:picChg>
+      </pc:sldChg>
+      <pc:sldChg chg="addSp delSp modSp add">
+        <pc:chgData name="Sergey Parshin" userId="33371af5f60a0596" providerId="LiveId" clId="{CD4EFC38-E4C9-4F8B-9A88-2D53C40DDBF0}" dt="2019-10-03T23:01:10.611" v="1550" actId="404"/>
+        <pc:sldMkLst>
+          <pc:docMk/>
+          <pc:sldMk cId="1326398291" sldId="318"/>
+        </pc:sldMkLst>
+        <pc:spChg chg="mod">
+          <ac:chgData name="Sergey Parshin" userId="33371af5f60a0596" providerId="LiveId" clId="{CD4EFC38-E4C9-4F8B-9A88-2D53C40DDBF0}" dt="2019-10-03T23:01:10.611" v="1550" actId="404"/>
+          <ac:spMkLst>
+            <pc:docMk/>
+            <pc:sldMk cId="1326398291" sldId="318"/>
+            <ac:spMk id="2" creationId="{0F5E4F47-9DA8-4CCF-805C-3F7A13EEE530}"/>
+          </ac:spMkLst>
+        </pc:spChg>
+        <pc:spChg chg="mod">
+          <ac:chgData name="Sergey Parshin" userId="33371af5f60a0596" providerId="LiveId" clId="{CD4EFC38-E4C9-4F8B-9A88-2D53C40DDBF0}" dt="2019-10-03T23:00:57.337" v="1541" actId="20577"/>
+          <ac:spMkLst>
+            <pc:docMk/>
+            <pc:sldMk cId="1326398291" sldId="318"/>
+            <ac:spMk id="5" creationId="{C4935C57-9BCF-4CDC-A3AA-07CC3FB0EABB}"/>
+          </ac:spMkLst>
+        </pc:spChg>
+        <pc:spChg chg="del">
+          <ac:chgData name="Sergey Parshin" userId="33371af5f60a0596" providerId="LiveId" clId="{CD4EFC38-E4C9-4F8B-9A88-2D53C40DDBF0}" dt="2019-10-03T22:41:16.445" v="1271" actId="478"/>
+          <ac:spMkLst>
+            <pc:docMk/>
+            <pc:sldMk cId="1326398291" sldId="318"/>
+            <ac:spMk id="6" creationId="{FE80234E-1EF0-4E41-9784-676EBD57FED6}"/>
+          </ac:spMkLst>
+        </pc:spChg>
+        <pc:picChg chg="add del">
+          <ac:chgData name="Sergey Parshin" userId="33371af5f60a0596" providerId="LiveId" clId="{CD4EFC38-E4C9-4F8B-9A88-2D53C40DDBF0}" dt="2019-10-03T23:00:29.370" v="1536" actId="478"/>
+          <ac:picMkLst>
+            <pc:docMk/>
+            <pc:sldMk cId="1326398291" sldId="318"/>
+            <ac:picMk id="3" creationId="{78C76BB3-31C4-4AE2-8A88-8BC06F8E280D}"/>
+          </ac:picMkLst>
+        </pc:picChg>
+        <pc:picChg chg="add del mod">
+          <ac:chgData name="Sergey Parshin" userId="33371af5f60a0596" providerId="LiveId" clId="{CD4EFC38-E4C9-4F8B-9A88-2D53C40DDBF0}" dt="2019-10-03T22:42:22.250" v="1276" actId="478"/>
+          <ac:picMkLst>
+            <pc:docMk/>
+            <pc:sldMk cId="1326398291" sldId="318"/>
+            <ac:picMk id="4" creationId="{1DEA422D-F1AD-4F8C-90E4-E9172F170641}"/>
+          </ac:picMkLst>
+        </pc:picChg>
+        <pc:picChg chg="add">
+          <ac:chgData name="Sergey Parshin" userId="33371af5f60a0596" providerId="LiveId" clId="{CD4EFC38-E4C9-4F8B-9A88-2D53C40DDBF0}" dt="2019-10-03T23:00:29.839" v="1537"/>
+          <ac:picMkLst>
+            <pc:docMk/>
+            <pc:sldMk cId="1326398291" sldId="318"/>
+            <ac:picMk id="7" creationId="{0CFA27EC-7063-44C6-A71D-E7E9D38FADD1}"/>
+          </ac:picMkLst>
+        </pc:picChg>
+      </pc:sldChg>
+      <pc:sldChg chg="modSp add">
+        <pc:chgData name="Sergey Parshin" userId="33371af5f60a0596" providerId="LiveId" clId="{CD4EFC38-E4C9-4F8B-9A88-2D53C40DDBF0}" dt="2019-10-03T22:54:41.818" v="1535" actId="20577"/>
+        <pc:sldMkLst>
+          <pc:docMk/>
+          <pc:sldMk cId="102770265" sldId="319"/>
+        </pc:sldMkLst>
+        <pc:spChg chg="mod">
+          <ac:chgData name="Sergey Parshin" userId="33371af5f60a0596" providerId="LiveId" clId="{CD4EFC38-E4C9-4F8B-9A88-2D53C40DDBF0}" dt="2019-10-03T22:54:41.818" v="1535" actId="20577"/>
+          <ac:spMkLst>
+            <pc:docMk/>
+            <pc:sldMk cId="102770265" sldId="319"/>
+            <ac:spMk id="2" creationId="{444FC6A2-5A40-4204-A08E-B7176AFEB2AF}"/>
+          </ac:spMkLst>
+        </pc:spChg>
+      </pc:sldChg>
+      <pc:sldChg chg="delSp modSp add del">
+        <pc:chgData name="Sergey Parshin" userId="33371af5f60a0596" providerId="LiveId" clId="{CD4EFC38-E4C9-4F8B-9A88-2D53C40DDBF0}" dt="2019-10-03T22:53:18.087" v="1507" actId="47"/>
+        <pc:sldMkLst>
+          <pc:docMk/>
+          <pc:sldMk cId="1211924983" sldId="319"/>
+        </pc:sldMkLst>
+        <pc:spChg chg="mod">
+          <ac:chgData name="Sergey Parshin" userId="33371af5f60a0596" providerId="LiveId" clId="{CD4EFC38-E4C9-4F8B-9A88-2D53C40DDBF0}" dt="2019-10-03T22:45:04.316" v="1283" actId="14100"/>
+          <ac:spMkLst>
+            <pc:docMk/>
+            <pc:sldMk cId="1211924983" sldId="319"/>
+            <ac:spMk id="2" creationId="{3340CABF-5241-4665-950E-902AC1D2FAEE}"/>
+          </ac:spMkLst>
+        </pc:spChg>
+        <pc:spChg chg="mod">
+          <ac:chgData name="Sergey Parshin" userId="33371af5f60a0596" providerId="LiveId" clId="{CD4EFC38-E4C9-4F8B-9A88-2D53C40DDBF0}" dt="2019-10-03T22:51:31.706" v="1505" actId="20577"/>
+          <ac:spMkLst>
+            <pc:docMk/>
+            <pc:sldMk cId="1211924983" sldId="319"/>
+            <ac:spMk id="3" creationId="{36FA157A-D60C-4AC6-9E30-F3EB5F40D6D3}"/>
+          </ac:spMkLst>
+        </pc:spChg>
+        <pc:picChg chg="del">
+          <ac:chgData name="Sergey Parshin" userId="33371af5f60a0596" providerId="LiveId" clId="{CD4EFC38-E4C9-4F8B-9A88-2D53C40DDBF0}" dt="2019-10-03T22:48:56.268" v="1312" actId="478"/>
+          <ac:picMkLst>
+            <pc:docMk/>
+            <pc:sldMk cId="1211924983" sldId="319"/>
+            <ac:picMk id="5" creationId="{7016AF2E-63E1-4BAE-9C31-30CBDAF7BC37}"/>
+          </ac:picMkLst>
+        </pc:picChg>
+      </pc:sldChg>
+      <pc:sldChg chg="add del">
+        <pc:chgData name="Sergey Parshin" userId="33371af5f60a0596" providerId="LiveId" clId="{CD4EFC38-E4C9-4F8B-9A88-2D53C40DDBF0}" dt="2019-10-03T22:53:22.291" v="1508" actId="47"/>
+        <pc:sldMkLst>
+          <pc:docMk/>
+          <pc:sldMk cId="1654182544" sldId="320"/>
+        </pc:sldMkLst>
+      </pc:sldChg>
+    </pc:docChg>
+  </pc:docChgLst>
+</pc:chgInfo>
 </file>
 
 <file path=ppt/slideLayouts/slideLayout1.xml><?xml version="1.0" encoding="utf-8"?>
@@ -15617,45 +16003,36 @@
           </a:p>
         </p:txBody>
       </p:sp>
-      <p:sp>
-        <p:nvSpPr>
-          <p:cNvPr id="5" name="TextBox 4">
-            <a:extLst>
-              <a:ext uri="{FF2B5EF4-FFF2-40B4-BE49-F238E27FC236}">
-                <a16:creationId xmlns:a16="http://schemas.microsoft.com/office/drawing/2014/main" id="{8F104885-7AE9-4758-98AD-D29DBDC0217D}"/>
-              </a:ext>
-            </a:extLst>
-          </p:cNvPr>
-          <p:cNvSpPr txBox="1"/>
+      <p:pic>
+        <p:nvPicPr>
+          <p:cNvPr id="6" name="Picture 5">
+            <a:extLst>
+              <a:ext uri="{FF2B5EF4-FFF2-40B4-BE49-F238E27FC236}">
+                <a16:creationId xmlns:a16="http://schemas.microsoft.com/office/drawing/2014/main" id="{CE3C0D16-F0AF-4DED-8515-1738273A43D5}"/>
+              </a:ext>
+            </a:extLst>
+          </p:cNvPr>
+          <p:cNvPicPr>
+            <a:picLocks noChangeAspect="1"/>
+          </p:cNvPicPr>
           <p:nvPr/>
-        </p:nvSpPr>
+        </p:nvPicPr>
+        <p:blipFill>
+          <a:blip r:embed="rId2"/>
+          <a:stretch>
+            <a:fillRect/>
+          </a:stretch>
+        </p:blipFill>
         <p:spPr>
           <a:xfrm>
-            <a:off x="1722782" y="2093844"/>
-            <a:ext cx="7697364" cy="3770263"/>
+            <a:off x="1370936" y="2012354"/>
+            <a:ext cx="9238095" cy="4847619"/>
           </a:xfrm>
           <a:prstGeom prst="rect">
             <a:avLst/>
           </a:prstGeom>
-          <a:noFill/>
         </p:spPr>
-        <p:txBody>
-          <a:bodyPr wrap="none" rtlCol="0">
-            <a:spAutoFit/>
-          </a:bodyPr>
-          <a:lstStyle/>
-          <a:p>
-            <a:r>
-              <a:rPr lang="en-IE" sz="23900" b="1" dirty="0">
-                <a:solidFill>
-                  <a:srgbClr val="FF0000"/>
-                </a:solidFill>
-              </a:rPr>
-              <a:t>TODO</a:t>
-            </a:r>
-          </a:p>
-        </p:txBody>
-      </p:sp>
+      </p:pic>
     </p:spTree>
     <p:extLst>
       <p:ext uri="{BB962C8B-B14F-4D97-AF65-F5344CB8AC3E}">
@@ -15747,45 +16124,36 @@
           </a:p>
         </p:txBody>
       </p:sp>
-      <p:sp>
-        <p:nvSpPr>
-          <p:cNvPr id="6" name="TextBox 5">
-            <a:extLst>
-              <a:ext uri="{FF2B5EF4-FFF2-40B4-BE49-F238E27FC236}">
-                <a16:creationId xmlns:a16="http://schemas.microsoft.com/office/drawing/2014/main" id="{E0B06561-0B19-4DA7-86F2-3E3BF6C8A3E1}"/>
-              </a:ext>
-            </a:extLst>
-          </p:cNvPr>
-          <p:cNvSpPr txBox="1"/>
+      <p:pic>
+        <p:nvPicPr>
+          <p:cNvPr id="4" name="Picture 3">
+            <a:extLst>
+              <a:ext uri="{FF2B5EF4-FFF2-40B4-BE49-F238E27FC236}">
+                <a16:creationId xmlns:a16="http://schemas.microsoft.com/office/drawing/2014/main" id="{CB2B5B83-06FE-46E4-AEFB-00719803C254}"/>
+              </a:ext>
+            </a:extLst>
+          </p:cNvPr>
+          <p:cNvPicPr>
+            <a:picLocks noChangeAspect="1"/>
+          </p:cNvPicPr>
           <p:nvPr/>
-        </p:nvSpPr>
+        </p:nvPicPr>
+        <p:blipFill>
+          <a:blip r:embed="rId2"/>
+          <a:stretch>
+            <a:fillRect/>
+          </a:stretch>
+        </p:blipFill>
         <p:spPr>
           <a:xfrm>
-            <a:off x="1722782" y="2093844"/>
-            <a:ext cx="7697364" cy="3770263"/>
+            <a:off x="3826915" y="0"/>
+            <a:ext cx="4538169" cy="6858000"/>
           </a:xfrm>
           <a:prstGeom prst="rect">
             <a:avLst/>
           </a:prstGeom>
-          <a:noFill/>
         </p:spPr>
-        <p:txBody>
-          <a:bodyPr wrap="none" rtlCol="0">
-            <a:spAutoFit/>
-          </a:bodyPr>
-          <a:lstStyle/>
-          <a:p>
-            <a:r>
-              <a:rPr lang="en-IE" sz="23900" b="1" dirty="0">
-                <a:solidFill>
-                  <a:srgbClr val="FF0000"/>
-                </a:solidFill>
-              </a:rPr>
-              <a:t>TODO</a:t>
-            </a:r>
-          </a:p>
-        </p:txBody>
-      </p:sp>
+      </p:pic>
     </p:spTree>
     <p:extLst>
       <p:ext uri="{BB962C8B-B14F-4D97-AF65-F5344CB8AC3E}">
@@ -15816,6 +16184,36 @@
           <a:chExt cx="0" cy="0"/>
         </a:xfrm>
       </p:grpSpPr>
+      <p:pic>
+        <p:nvPicPr>
+          <p:cNvPr id="4" name="Picture 3">
+            <a:extLst>
+              <a:ext uri="{FF2B5EF4-FFF2-40B4-BE49-F238E27FC236}">
+                <a16:creationId xmlns:a16="http://schemas.microsoft.com/office/drawing/2014/main" id="{BA83B37F-2BA6-4C99-804B-3D3D02594F87}"/>
+              </a:ext>
+            </a:extLst>
+          </p:cNvPr>
+          <p:cNvPicPr>
+            <a:picLocks noChangeAspect="1"/>
+          </p:cNvPicPr>
+          <p:nvPr/>
+        </p:nvPicPr>
+        <p:blipFill>
+          <a:blip r:embed="rId2"/>
+          <a:stretch>
+            <a:fillRect/>
+          </a:stretch>
+        </p:blipFill>
+        <p:spPr>
+          <a:xfrm>
+            <a:off x="838200" y="1842639"/>
+            <a:ext cx="10376452" cy="5323336"/>
+          </a:xfrm>
+          <a:prstGeom prst="rect">
+            <a:avLst/>
+          </a:prstGeom>
+        </p:spPr>
+      </p:pic>
       <p:sp>
         <p:nvSpPr>
           <p:cNvPr id="2" name="Title 1">
@@ -15873,45 +16271,6 @@
             <a:r>
               <a:rPr lang="en-IE" dirty="0"/>
               <a:t>Ethernet preamble detection</a:t>
-            </a:r>
-          </a:p>
-        </p:txBody>
-      </p:sp>
-      <p:sp>
-        <p:nvSpPr>
-          <p:cNvPr id="5" name="TextBox 4">
-            <a:extLst>
-              <a:ext uri="{FF2B5EF4-FFF2-40B4-BE49-F238E27FC236}">
-                <a16:creationId xmlns:a16="http://schemas.microsoft.com/office/drawing/2014/main" id="{ABA49CC2-941D-4F02-AB01-EBB4D2721268}"/>
-              </a:ext>
-            </a:extLst>
-          </p:cNvPr>
-          <p:cNvSpPr txBox="1"/>
-          <p:nvPr/>
-        </p:nvSpPr>
-        <p:spPr>
-          <a:xfrm>
-            <a:off x="1722782" y="2093844"/>
-            <a:ext cx="7697364" cy="3770263"/>
-          </a:xfrm>
-          <a:prstGeom prst="rect">
-            <a:avLst/>
-          </a:prstGeom>
-          <a:noFill/>
-        </p:spPr>
-        <p:txBody>
-          <a:bodyPr wrap="none" rtlCol="0">
-            <a:spAutoFit/>
-          </a:bodyPr>
-          <a:lstStyle/>
-          <a:p>
-            <a:r>
-              <a:rPr lang="en-IE" sz="23900" b="1" dirty="0">
-                <a:solidFill>
-                  <a:srgbClr val="FF0000"/>
-                </a:solidFill>
-              </a:rPr>
-              <a:t>TODO</a:t>
             </a:r>
           </a:p>
         </p:txBody>
@@ -15998,13 +16357,13 @@
         </p:spPr>
         <p:txBody>
           <a:bodyPr>
-            <a:normAutofit/>
+            <a:normAutofit lnSpcReduction="10000"/>
           </a:bodyPr>
           <a:lstStyle/>
           <a:p>
             <a:r>
               <a:rPr lang="en-IE" dirty="0"/>
-              <a:t>The pair of configurable logical function coupled with the flip-flop is basically a basic block of any FPGA, called </a:t>
+              <a:t>The pair of configurable logical function coupled with the flip-flop is basically an elementary construction of any FPGA, called </a:t>
             </a:r>
             <a:r>
               <a:rPr lang="en-IE" b="1" dirty="0"/>
@@ -16016,18 +16375,17 @@
             </a:r>
             <a:r>
               <a:rPr lang="en-IE" b="1" dirty="0"/>
-              <a:t>“Configurable Logic Block”</a:t>
+              <a:t>“Configurable Logic Block” – CLB</a:t>
             </a:r>
             <a:r>
               <a:rPr lang="en-IE" dirty="0"/>
-              <a:t>.</a:t>
-            </a:r>
-            <a:endParaRPr lang="en-IE" b="1" dirty="0"/>
+              <a:t> for short.</a:t>
+            </a:r>
           </a:p>
           <a:p>
             <a:r>
               <a:rPr lang="en-IE" dirty="0"/>
-              <a:t>Configurable logical function is called LUT, implemented as a simple lookup table</a:t>
+              <a:t>Configurable logical function is called LUT, implemented as a simple lookup table, can have between 3 and 6 inputs and 1 or several bits of output. </a:t>
             </a:r>
           </a:p>
           <a:p>
@@ -16039,7 +16397,13 @@
           <a:p>
             <a:r>
               <a:rPr lang="en-IE" dirty="0"/>
-              <a:t>These building blocks are arranged into a huge arrays with configurable interconnects </a:t>
+              <a:t>CLB might contain additional logic to accelerate addition operation, etc.</a:t>
+            </a:r>
+          </a:p>
+          <a:p>
+            <a:r>
+              <a:rPr lang="en-IE" dirty="0"/>
+              <a:t>These CLBs are arranged into a huge arrays with configurable interconnects </a:t>
             </a:r>
           </a:p>
         </p:txBody>
@@ -16097,7 +16461,136 @@
           <a:p>
             <a:r>
               <a:rPr lang="en-IE" dirty="0"/>
-              <a:t>FPGA</a:t>
+              <a:t>FPGA, simplified configurable logic block</a:t>
+            </a:r>
+          </a:p>
+        </p:txBody>
+      </p:sp>
+      <p:pic>
+        <p:nvPicPr>
+          <p:cNvPr id="5" name="Picture 4">
+            <a:extLst>
+              <a:ext uri="{FF2B5EF4-FFF2-40B4-BE49-F238E27FC236}">
+                <a16:creationId xmlns:a16="http://schemas.microsoft.com/office/drawing/2014/main" id="{92331335-08D8-46CA-896D-D83EB4889401}"/>
+              </a:ext>
+            </a:extLst>
+          </p:cNvPr>
+          <p:cNvPicPr>
+            <a:picLocks noChangeAspect="1"/>
+          </p:cNvPicPr>
+          <p:nvPr/>
+        </p:nvPicPr>
+        <p:blipFill>
+          <a:blip r:embed="rId2">
+            <a:extLst>
+              <a:ext uri="{28A0092B-C50C-407E-A947-70E740481C1C}">
+                <a14:useLocalDpi xmlns:a14="http://schemas.microsoft.com/office/drawing/2010/main" val="0"/>
+              </a:ext>
+            </a:extLst>
+          </a:blip>
+          <a:stretch>
+            <a:fillRect/>
+          </a:stretch>
+        </p:blipFill>
+        <p:spPr>
+          <a:xfrm>
+            <a:off x="1284996" y="1594972"/>
+            <a:ext cx="9881935" cy="4440068"/>
+          </a:xfrm>
+          <a:prstGeom prst="rect">
+            <a:avLst/>
+          </a:prstGeom>
+        </p:spPr>
+      </p:pic>
+    </p:spTree>
+    <p:extLst>
+      <p:ext uri="{BB962C8B-B14F-4D97-AF65-F5344CB8AC3E}">
+        <p14:creationId xmlns:p14="http://schemas.microsoft.com/office/powerpoint/2010/main" val="602141131"/>
+      </p:ext>
+    </p:extLst>
+  </p:cSld>
+  <p:clrMapOvr>
+    <a:masterClrMapping/>
+  </p:clrMapOvr>
+</p:sld>
+</file>
+
+<file path=ppt/slides/slide57.xml><?xml version="1.0" encoding="utf-8"?>
+<p:sld xmlns:a="http://schemas.openxmlformats.org/drawingml/2006/main" xmlns:r="http://schemas.openxmlformats.org/officeDocument/2006/relationships" xmlns:p="http://schemas.openxmlformats.org/presentationml/2006/main">
+  <p:cSld>
+    <p:spTree>
+      <p:nvGrpSpPr>
+        <p:cNvPr id="1" name=""/>
+        <p:cNvGrpSpPr/>
+        <p:nvPr/>
+      </p:nvGrpSpPr>
+      <p:grpSpPr>
+        <a:xfrm>
+          <a:off x="0" y="0"/>
+          <a:ext cx="0" cy="0"/>
+          <a:chOff x="0" y="0"/>
+          <a:chExt cx="0" cy="0"/>
+        </a:xfrm>
+      </p:grpSpPr>
+      <p:pic>
+        <p:nvPicPr>
+          <p:cNvPr id="5" name="Picture 4">
+            <a:extLst>
+              <a:ext uri="{FF2B5EF4-FFF2-40B4-BE49-F238E27FC236}">
+                <a16:creationId xmlns:a16="http://schemas.microsoft.com/office/drawing/2014/main" id="{7016AF2E-63E1-4BAE-9C31-30CBDAF7BC37}"/>
+              </a:ext>
+            </a:extLst>
+          </p:cNvPr>
+          <p:cNvPicPr>
+            <a:picLocks noChangeAspect="1"/>
+          </p:cNvPicPr>
+          <p:nvPr/>
+        </p:nvPicPr>
+        <p:blipFill>
+          <a:blip r:embed="rId2"/>
+          <a:stretch>
+            <a:fillRect/>
+          </a:stretch>
+        </p:blipFill>
+        <p:spPr>
+          <a:xfrm>
+            <a:off x="7481720" y="2209800"/>
+            <a:ext cx="4533900" cy="3448050"/>
+          </a:xfrm>
+          <a:prstGeom prst="rect">
+            <a:avLst/>
+          </a:prstGeom>
+        </p:spPr>
+      </p:pic>
+      <p:sp>
+        <p:nvSpPr>
+          <p:cNvPr id="2" name="Title 1">
+            <a:extLst>
+              <a:ext uri="{FF2B5EF4-FFF2-40B4-BE49-F238E27FC236}">
+                <a16:creationId xmlns:a16="http://schemas.microsoft.com/office/drawing/2014/main" id="{3340CABF-5241-4665-950E-902AC1D2FAEE}"/>
+              </a:ext>
+            </a:extLst>
+          </p:cNvPr>
+          <p:cNvSpPr>
+            <a:spLocks noGrp="1"/>
+          </p:cNvSpPr>
+          <p:nvPr>
+            <p:ph type="title"/>
+          </p:nvPr>
+        </p:nvSpPr>
+        <p:spPr>
+          <a:xfrm>
+            <a:off x="838200" y="365125"/>
+            <a:ext cx="10515600" cy="1325563"/>
+          </a:xfrm>
+        </p:spPr>
+        <p:txBody>
+          <a:bodyPr/>
+          <a:lstStyle/>
+          <a:p>
+            <a:r>
+              <a:rPr lang="en-IE" dirty="0"/>
+              <a:t>FPGA: CLBs in a real world, Spartan 6 example</a:t>
             </a:r>
           </a:p>
         </p:txBody>
@@ -16121,34 +16614,136 @@
         <p:spPr>
           <a:xfrm>
             <a:off x="838200" y="1431235"/>
-            <a:ext cx="10515600" cy="4745728"/>
+            <a:ext cx="7305339" cy="4745728"/>
           </a:xfrm>
         </p:spPr>
         <p:txBody>
           <a:bodyPr>
-            <a:normAutofit/>
+            <a:normAutofit lnSpcReduction="10000"/>
           </a:bodyPr>
           <a:lstStyle/>
           <a:p>
             <a:r>
               <a:rPr lang="en-IE" dirty="0"/>
-              <a:t>In real world, FPGAs do have a bit more complex structure of the logic cells</a:t>
+              <a:t>Xilinx Spartan 6, each CLB contains two “slices”</a:t>
             </a:r>
           </a:p>
           <a:p>
             <a:r>
               <a:rPr lang="en-IE" dirty="0"/>
-              <a:t>Still simplified structure:  </a:t>
+              <a:t>Each slice is approximately identical and includes actual programmable logic  </a:t>
+            </a:r>
+          </a:p>
+          <a:p>
+            <a:r>
+              <a:rPr lang="en-IE" dirty="0"/>
+              <a:t>There are three slice types on Spartan 6: SLICEM, SLICEL, SLICEX</a:t>
+            </a:r>
+          </a:p>
+          <a:p>
+            <a:r>
+              <a:rPr lang="en-IE" dirty="0"/>
+              <a:t>Each type of slice contains a set of 6-input LUTs and 8 Flip-Flops</a:t>
+            </a:r>
+          </a:p>
+          <a:p>
+            <a:r>
+              <a:rPr lang="en-IE" dirty="0"/>
+              <a:t>SLICEL and SLICEM also contain carry logic and wide multiplexers </a:t>
+            </a:r>
+          </a:p>
+          <a:p>
+            <a:r>
+              <a:rPr lang="en-IE" dirty="0"/>
+              <a:t>SLCIEM also has Distributed RAM and Shift Registers on board.</a:t>
             </a:r>
           </a:p>
         </p:txBody>
       </p:sp>
+      <p:sp>
+        <p:nvSpPr>
+          <p:cNvPr id="6" name="TextBox 5">
+            <a:extLst>
+              <a:ext uri="{FF2B5EF4-FFF2-40B4-BE49-F238E27FC236}">
+                <a16:creationId xmlns:a16="http://schemas.microsoft.com/office/drawing/2014/main" id="{AC4F6529-251C-4262-901D-9FC7E0019B8A}"/>
+              </a:ext>
+            </a:extLst>
+          </p:cNvPr>
+          <p:cNvSpPr txBox="1"/>
+          <p:nvPr/>
+        </p:nvSpPr>
+        <p:spPr>
+          <a:xfrm>
+            <a:off x="247426" y="6492875"/>
+            <a:ext cx="9057939" cy="646331"/>
+          </a:xfrm>
+          <a:prstGeom prst="rect">
+            <a:avLst/>
+          </a:prstGeom>
+          <a:noFill/>
+        </p:spPr>
+        <p:txBody>
+          <a:bodyPr wrap="square" rtlCol="0">
+            <a:spAutoFit/>
+          </a:bodyPr>
+          <a:lstStyle/>
+          <a:p>
+            <a:r>
+              <a:rPr lang="en-IE" dirty="0"/>
+              <a:t>Image, Source: </a:t>
+            </a:r>
+            <a:r>
+              <a:rPr lang="en-IE" dirty="0">
+                <a:hlinkClick r:id="rId3"/>
+              </a:rPr>
+              <a:t>https://www.xilinx.com/support/documentation/user_guides/ug384.pdf</a:t>
+            </a:r>
+            <a:r>
+              <a:rPr lang="en-IE" dirty="0"/>
+              <a:t> </a:t>
+            </a:r>
+          </a:p>
+          <a:p>
+            <a:endParaRPr lang="en-IE" dirty="0"/>
+          </a:p>
+        </p:txBody>
+      </p:sp>
+    </p:spTree>
+    <p:extLst>
+      <p:ext uri="{BB962C8B-B14F-4D97-AF65-F5344CB8AC3E}">
+        <p14:creationId xmlns:p14="http://schemas.microsoft.com/office/powerpoint/2010/main" val="4075998874"/>
+      </p:ext>
+    </p:extLst>
+  </p:cSld>
+  <p:clrMapOvr>
+    <a:masterClrMapping/>
+  </p:clrMapOvr>
+</p:sld>
+</file>
+
+<file path=ppt/slides/slide58.xml><?xml version="1.0" encoding="utf-8"?>
+<p:sld xmlns:a="http://schemas.openxmlformats.org/drawingml/2006/main" xmlns:r="http://schemas.openxmlformats.org/officeDocument/2006/relationships" xmlns:p="http://schemas.openxmlformats.org/presentationml/2006/main">
+  <p:cSld>
+    <p:spTree>
+      <p:nvGrpSpPr>
+        <p:cNvPr id="1" name=""/>
+        <p:cNvGrpSpPr/>
+        <p:nvPr/>
+      </p:nvGrpSpPr>
+      <p:grpSpPr>
+        <a:xfrm>
+          <a:off x="0" y="0"/>
+          <a:ext cx="0" cy="0"/>
+          <a:chOff x="0" y="0"/>
+          <a:chExt cx="0" cy="0"/>
+        </a:xfrm>
+      </p:grpSpPr>
       <p:pic>
         <p:nvPicPr>
-          <p:cNvPr id="5" name="Picture 4">
-            <a:extLst>
-              <a:ext uri="{FF2B5EF4-FFF2-40B4-BE49-F238E27FC236}">
-                <a16:creationId xmlns:a16="http://schemas.microsoft.com/office/drawing/2014/main" id="{92331335-08D8-46CA-896D-D83EB4889401}"/>
+          <p:cNvPr id="8" name="Picture 7">
+            <a:extLst>
+              <a:ext uri="{FF2B5EF4-FFF2-40B4-BE49-F238E27FC236}">
+                <a16:creationId xmlns:a16="http://schemas.microsoft.com/office/drawing/2014/main" id="{88757E61-16B7-4676-9C0E-CEEA22402B1B}"/>
               </a:ext>
             </a:extLst>
           </p:cNvPr>
@@ -16158,31 +16753,251 @@
           <p:nvPr/>
         </p:nvPicPr>
         <p:blipFill>
-          <a:blip r:embed="rId2">
-            <a:extLst>
-              <a:ext uri="{28A0092B-C50C-407E-A947-70E740481C1C}">
-                <a14:useLocalDpi xmlns:a14="http://schemas.microsoft.com/office/drawing/2010/main" val="0"/>
-              </a:ext>
-            </a:extLst>
-          </a:blip>
+          <a:blip r:embed="rId2"/>
           <a:stretch>
             <a:fillRect/>
           </a:stretch>
         </p:blipFill>
         <p:spPr>
           <a:xfrm>
-            <a:off x="1801363" y="2756798"/>
-            <a:ext cx="8589273" cy="3859260"/>
+            <a:off x="5595726" y="0"/>
+            <a:ext cx="5239062" cy="6858000"/>
           </a:xfrm>
           <a:prstGeom prst="rect">
             <a:avLst/>
           </a:prstGeom>
         </p:spPr>
       </p:pic>
+      <p:sp>
+        <p:nvSpPr>
+          <p:cNvPr id="2" name="Title 1">
+            <a:extLst>
+              <a:ext uri="{FF2B5EF4-FFF2-40B4-BE49-F238E27FC236}">
+                <a16:creationId xmlns:a16="http://schemas.microsoft.com/office/drawing/2014/main" id="{3340CABF-5241-4665-950E-902AC1D2FAEE}"/>
+              </a:ext>
+            </a:extLst>
+          </p:cNvPr>
+          <p:cNvSpPr>
+            <a:spLocks noGrp="1"/>
+          </p:cNvSpPr>
+          <p:nvPr>
+            <p:ph type="title"/>
+          </p:nvPr>
+        </p:nvSpPr>
+        <p:spPr>
+          <a:xfrm>
+            <a:off x="117438" y="0"/>
+            <a:ext cx="4949414" cy="1097280"/>
+          </a:xfrm>
+        </p:spPr>
+        <p:txBody>
+          <a:bodyPr>
+            <a:normAutofit fontScale="90000"/>
+          </a:bodyPr>
+          <a:lstStyle/>
+          <a:p>
+            <a:r>
+              <a:rPr lang="en-IE" dirty="0"/>
+              <a:t>FPGA: Xilinx Spartan 6, SLICEX: </a:t>
+            </a:r>
+          </a:p>
+        </p:txBody>
+      </p:sp>
+      <p:sp>
+        <p:nvSpPr>
+          <p:cNvPr id="4" name="TextBox 3">
+            <a:extLst>
+              <a:ext uri="{FF2B5EF4-FFF2-40B4-BE49-F238E27FC236}">
+                <a16:creationId xmlns:a16="http://schemas.microsoft.com/office/drawing/2014/main" id="{BC51F177-36DB-4509-9D21-9ADB67BC2573}"/>
+              </a:ext>
+            </a:extLst>
+          </p:cNvPr>
+          <p:cNvSpPr txBox="1"/>
+          <p:nvPr/>
+        </p:nvSpPr>
+        <p:spPr>
+          <a:xfrm>
+            <a:off x="0" y="5769685"/>
+            <a:ext cx="4367605" cy="1200329"/>
+          </a:xfrm>
+          <a:prstGeom prst="rect">
+            <a:avLst/>
+          </a:prstGeom>
+          <a:noFill/>
+        </p:spPr>
+        <p:txBody>
+          <a:bodyPr wrap="square" rtlCol="0">
+            <a:spAutoFit/>
+          </a:bodyPr>
+          <a:lstStyle/>
+          <a:p>
+            <a:r>
+              <a:rPr lang="en-IE" dirty="0"/>
+              <a:t>© Xilinx, Source: </a:t>
+            </a:r>
+            <a:r>
+              <a:rPr lang="en-IE" dirty="0">
+                <a:hlinkClick r:id="rId3"/>
+              </a:rPr>
+              <a:t>https://www.xilinx.com/support/documentation/user_guides/ug384.pdf</a:t>
+            </a:r>
+            <a:r>
+              <a:rPr lang="en-IE" dirty="0"/>
+              <a:t> </a:t>
+            </a:r>
+          </a:p>
+          <a:p>
+            <a:endParaRPr lang="en-IE" dirty="0"/>
+          </a:p>
+        </p:txBody>
+      </p:sp>
     </p:spTree>
     <p:extLst>
       <p:ext uri="{BB962C8B-B14F-4D97-AF65-F5344CB8AC3E}">
-        <p14:creationId xmlns:p14="http://schemas.microsoft.com/office/powerpoint/2010/main" val="602141131"/>
+        <p14:creationId xmlns:p14="http://schemas.microsoft.com/office/powerpoint/2010/main" val="3376517106"/>
+      </p:ext>
+    </p:extLst>
+  </p:cSld>
+  <p:clrMapOvr>
+    <a:masterClrMapping/>
+  </p:clrMapOvr>
+</p:sld>
+</file>
+
+<file path=ppt/slides/slide59.xml><?xml version="1.0" encoding="utf-8"?>
+<p:sld xmlns:a="http://schemas.openxmlformats.org/drawingml/2006/main" xmlns:r="http://schemas.openxmlformats.org/officeDocument/2006/relationships" xmlns:p="http://schemas.openxmlformats.org/presentationml/2006/main">
+  <p:cSld>
+    <p:spTree>
+      <p:nvGrpSpPr>
+        <p:cNvPr id="1" name=""/>
+        <p:cNvGrpSpPr/>
+        <p:nvPr/>
+      </p:nvGrpSpPr>
+      <p:grpSpPr>
+        <a:xfrm>
+          <a:off x="0" y="0"/>
+          <a:ext cx="0" cy="0"/>
+          <a:chOff x="0" y="0"/>
+          <a:chExt cx="0" cy="0"/>
+        </a:xfrm>
+      </p:grpSpPr>
+      <p:pic>
+        <p:nvPicPr>
+          <p:cNvPr id="7" name="Picture 6">
+            <a:extLst>
+              <a:ext uri="{FF2B5EF4-FFF2-40B4-BE49-F238E27FC236}">
+                <a16:creationId xmlns:a16="http://schemas.microsoft.com/office/drawing/2014/main" id="{1675D2FA-770D-43A4-9EC7-C54235098BDF}"/>
+              </a:ext>
+            </a:extLst>
+          </p:cNvPr>
+          <p:cNvPicPr>
+            <a:picLocks noChangeAspect="1"/>
+          </p:cNvPicPr>
+          <p:nvPr/>
+        </p:nvPicPr>
+        <p:blipFill>
+          <a:blip r:embed="rId2"/>
+          <a:stretch>
+            <a:fillRect/>
+          </a:stretch>
+        </p:blipFill>
+        <p:spPr>
+          <a:xfrm>
+            <a:off x="5378322" y="0"/>
+            <a:ext cx="6229466" cy="6858000"/>
+          </a:xfrm>
+          <a:prstGeom prst="rect">
+            <a:avLst/>
+          </a:prstGeom>
+        </p:spPr>
+      </p:pic>
+      <p:sp>
+        <p:nvSpPr>
+          <p:cNvPr id="2" name="Title 1">
+            <a:extLst>
+              <a:ext uri="{FF2B5EF4-FFF2-40B4-BE49-F238E27FC236}">
+                <a16:creationId xmlns:a16="http://schemas.microsoft.com/office/drawing/2014/main" id="{3340CABF-5241-4665-950E-902AC1D2FAEE}"/>
+              </a:ext>
+            </a:extLst>
+          </p:cNvPr>
+          <p:cNvSpPr>
+            <a:spLocks noGrp="1"/>
+          </p:cNvSpPr>
+          <p:nvPr>
+            <p:ph type="title"/>
+          </p:nvPr>
+        </p:nvSpPr>
+        <p:spPr>
+          <a:xfrm>
+            <a:off x="117438" y="0"/>
+            <a:ext cx="4949414" cy="1097280"/>
+          </a:xfrm>
+        </p:spPr>
+        <p:txBody>
+          <a:bodyPr>
+            <a:normAutofit fontScale="90000"/>
+          </a:bodyPr>
+          <a:lstStyle/>
+          <a:p>
+            <a:r>
+              <a:rPr lang="en-IE" dirty="0"/>
+              <a:t>FPGA: Xilinx Spartan 6, SLICEL: </a:t>
+            </a:r>
+          </a:p>
+        </p:txBody>
+      </p:sp>
+      <p:sp>
+        <p:nvSpPr>
+          <p:cNvPr id="4" name="TextBox 3">
+            <a:extLst>
+              <a:ext uri="{FF2B5EF4-FFF2-40B4-BE49-F238E27FC236}">
+                <a16:creationId xmlns:a16="http://schemas.microsoft.com/office/drawing/2014/main" id="{BC51F177-36DB-4509-9D21-9ADB67BC2573}"/>
+              </a:ext>
+            </a:extLst>
+          </p:cNvPr>
+          <p:cNvSpPr txBox="1"/>
+          <p:nvPr/>
+        </p:nvSpPr>
+        <p:spPr>
+          <a:xfrm>
+            <a:off x="0" y="5769685"/>
+            <a:ext cx="4367605" cy="1200329"/>
+          </a:xfrm>
+          <a:prstGeom prst="rect">
+            <a:avLst/>
+          </a:prstGeom>
+          <a:noFill/>
+        </p:spPr>
+        <p:txBody>
+          <a:bodyPr wrap="square" rtlCol="0">
+            <a:spAutoFit/>
+          </a:bodyPr>
+          <a:lstStyle/>
+          <a:p>
+            <a:r>
+              <a:rPr lang="en-IE" dirty="0"/>
+              <a:t>© Xilinx, Source: </a:t>
+            </a:r>
+            <a:r>
+              <a:rPr lang="en-IE" dirty="0">
+                <a:hlinkClick r:id="rId3"/>
+              </a:rPr>
+              <a:t>https://www.xilinx.com/support/documentation/user_guides/ug384.pdf</a:t>
+            </a:r>
+            <a:r>
+              <a:rPr lang="en-IE" dirty="0"/>
+              <a:t> </a:t>
+            </a:r>
+          </a:p>
+          <a:p>
+            <a:endParaRPr lang="en-IE" dirty="0"/>
+          </a:p>
+        </p:txBody>
+      </p:sp>
+    </p:spTree>
+    <p:extLst>
+      <p:ext uri="{BB962C8B-B14F-4D97-AF65-F5344CB8AC3E}">
+        <p14:creationId xmlns:p14="http://schemas.microsoft.com/office/powerpoint/2010/main" val="4233348570"/>
       </p:ext>
     </p:extLst>
   </p:cSld>
@@ -17201,6 +18016,583 @@
       </p:par>
     </p:tnLst>
   </p:timing>
+</p:sld>
+</file>
+
+<file path=ppt/slides/slide60.xml><?xml version="1.0" encoding="utf-8"?>
+<p:sld xmlns:a="http://schemas.openxmlformats.org/drawingml/2006/main" xmlns:r="http://schemas.openxmlformats.org/officeDocument/2006/relationships" xmlns:p="http://schemas.openxmlformats.org/presentationml/2006/main">
+  <p:cSld>
+    <p:spTree>
+      <p:nvGrpSpPr>
+        <p:cNvPr id="1" name=""/>
+        <p:cNvGrpSpPr/>
+        <p:nvPr/>
+      </p:nvGrpSpPr>
+      <p:grpSpPr>
+        <a:xfrm>
+          <a:off x="0" y="0"/>
+          <a:ext cx="0" cy="0"/>
+          <a:chOff x="0" y="0"/>
+          <a:chExt cx="0" cy="0"/>
+        </a:xfrm>
+      </p:grpSpPr>
+      <p:pic>
+        <p:nvPicPr>
+          <p:cNvPr id="3" name="Picture 2">
+            <a:extLst>
+              <a:ext uri="{FF2B5EF4-FFF2-40B4-BE49-F238E27FC236}">
+                <a16:creationId xmlns:a16="http://schemas.microsoft.com/office/drawing/2014/main" id="{293B1A1E-3D30-423C-8E70-3EA68DA5D868}"/>
+              </a:ext>
+            </a:extLst>
+          </p:cNvPr>
+          <p:cNvPicPr>
+            <a:picLocks noChangeAspect="1"/>
+          </p:cNvPicPr>
+          <p:nvPr/>
+        </p:nvPicPr>
+        <p:blipFill>
+          <a:blip r:embed="rId2"/>
+          <a:stretch>
+            <a:fillRect/>
+          </a:stretch>
+        </p:blipFill>
+        <p:spPr>
+          <a:xfrm>
+            <a:off x="4978198" y="0"/>
+            <a:ext cx="6603214" cy="6858000"/>
+          </a:xfrm>
+          <a:prstGeom prst="rect">
+            <a:avLst/>
+          </a:prstGeom>
+        </p:spPr>
+      </p:pic>
+      <p:sp>
+        <p:nvSpPr>
+          <p:cNvPr id="2" name="Title 1">
+            <a:extLst>
+              <a:ext uri="{FF2B5EF4-FFF2-40B4-BE49-F238E27FC236}">
+                <a16:creationId xmlns:a16="http://schemas.microsoft.com/office/drawing/2014/main" id="{3340CABF-5241-4665-950E-902AC1D2FAEE}"/>
+              </a:ext>
+            </a:extLst>
+          </p:cNvPr>
+          <p:cNvSpPr>
+            <a:spLocks noGrp="1"/>
+          </p:cNvSpPr>
+          <p:nvPr>
+            <p:ph type="title"/>
+          </p:nvPr>
+        </p:nvSpPr>
+        <p:spPr>
+          <a:xfrm>
+            <a:off x="117438" y="0"/>
+            <a:ext cx="4949414" cy="1097280"/>
+          </a:xfrm>
+        </p:spPr>
+        <p:txBody>
+          <a:bodyPr>
+            <a:normAutofit fontScale="90000"/>
+          </a:bodyPr>
+          <a:lstStyle/>
+          <a:p>
+            <a:r>
+              <a:rPr lang="en-IE" dirty="0"/>
+              <a:t>FPGA: Xilinx Spartan 6, SLICEM: </a:t>
+            </a:r>
+          </a:p>
+        </p:txBody>
+      </p:sp>
+      <p:sp>
+        <p:nvSpPr>
+          <p:cNvPr id="4" name="TextBox 3">
+            <a:extLst>
+              <a:ext uri="{FF2B5EF4-FFF2-40B4-BE49-F238E27FC236}">
+                <a16:creationId xmlns:a16="http://schemas.microsoft.com/office/drawing/2014/main" id="{BC51F177-36DB-4509-9D21-9ADB67BC2573}"/>
+              </a:ext>
+            </a:extLst>
+          </p:cNvPr>
+          <p:cNvSpPr txBox="1"/>
+          <p:nvPr/>
+        </p:nvSpPr>
+        <p:spPr>
+          <a:xfrm>
+            <a:off x="0" y="5769685"/>
+            <a:ext cx="4367605" cy="1200329"/>
+          </a:xfrm>
+          <a:prstGeom prst="rect">
+            <a:avLst/>
+          </a:prstGeom>
+          <a:noFill/>
+        </p:spPr>
+        <p:txBody>
+          <a:bodyPr wrap="square" rtlCol="0">
+            <a:spAutoFit/>
+          </a:bodyPr>
+          <a:lstStyle/>
+          <a:p>
+            <a:r>
+              <a:rPr lang="en-IE" dirty="0"/>
+              <a:t>© Xilinx, Source: </a:t>
+            </a:r>
+            <a:r>
+              <a:rPr lang="en-IE" dirty="0">
+                <a:hlinkClick r:id="rId3"/>
+              </a:rPr>
+              <a:t>https://www.xilinx.com/support/documentation/user_guides/ug384.pdf</a:t>
+            </a:r>
+            <a:r>
+              <a:rPr lang="en-IE" dirty="0"/>
+              <a:t> </a:t>
+            </a:r>
+          </a:p>
+          <a:p>
+            <a:endParaRPr lang="en-IE" dirty="0"/>
+          </a:p>
+        </p:txBody>
+      </p:sp>
+    </p:spTree>
+    <p:extLst>
+      <p:ext uri="{BB962C8B-B14F-4D97-AF65-F5344CB8AC3E}">
+        <p14:creationId xmlns:p14="http://schemas.microsoft.com/office/powerpoint/2010/main" val="1778258312"/>
+      </p:ext>
+    </p:extLst>
+  </p:cSld>
+  <p:clrMapOvr>
+    <a:masterClrMapping/>
+  </p:clrMapOvr>
+</p:sld>
+</file>
+
+<file path=ppt/slides/slide61.xml><?xml version="1.0" encoding="utf-8"?>
+<p:sld xmlns:a="http://schemas.openxmlformats.org/drawingml/2006/main" xmlns:r="http://schemas.openxmlformats.org/officeDocument/2006/relationships" xmlns:p="http://schemas.openxmlformats.org/presentationml/2006/main">
+  <p:cSld>
+    <p:spTree>
+      <p:nvGrpSpPr>
+        <p:cNvPr id="1" name=""/>
+        <p:cNvGrpSpPr/>
+        <p:nvPr/>
+      </p:nvGrpSpPr>
+      <p:grpSpPr>
+        <a:xfrm>
+          <a:off x="0" y="0"/>
+          <a:ext cx="0" cy="0"/>
+          <a:chOff x="0" y="0"/>
+          <a:chExt cx="0" cy="0"/>
+        </a:xfrm>
+      </p:grpSpPr>
+      <p:sp>
+        <p:nvSpPr>
+          <p:cNvPr id="2" name="Title 1">
+            <a:extLst>
+              <a:ext uri="{FF2B5EF4-FFF2-40B4-BE49-F238E27FC236}">
+                <a16:creationId xmlns:a16="http://schemas.microsoft.com/office/drawing/2014/main" id="{0F5E4F47-9DA8-4CCF-805C-3F7A13EEE530}"/>
+              </a:ext>
+            </a:extLst>
+          </p:cNvPr>
+          <p:cNvSpPr>
+            <a:spLocks noGrp="1"/>
+          </p:cNvSpPr>
+          <p:nvPr>
+            <p:ph type="title"/>
+          </p:nvPr>
+        </p:nvSpPr>
+        <p:spPr>
+          <a:xfrm>
+            <a:off x="377070" y="1"/>
+            <a:ext cx="10515600" cy="548640"/>
+          </a:xfrm>
+        </p:spPr>
+        <p:txBody>
+          <a:bodyPr>
+            <a:normAutofit fontScale="90000"/>
+          </a:bodyPr>
+          <a:lstStyle/>
+          <a:p>
+            <a:r>
+              <a:rPr lang="en-IE" dirty="0"/>
+              <a:t>Xilinx Spartan 6 family</a:t>
+            </a:r>
+          </a:p>
+        </p:txBody>
+      </p:sp>
+      <p:pic>
+        <p:nvPicPr>
+          <p:cNvPr id="4" name="Picture 3">
+            <a:extLst>
+              <a:ext uri="{FF2B5EF4-FFF2-40B4-BE49-F238E27FC236}">
+                <a16:creationId xmlns:a16="http://schemas.microsoft.com/office/drawing/2014/main" id="{1DEA422D-F1AD-4F8C-90E4-E9172F170641}"/>
+              </a:ext>
+            </a:extLst>
+          </p:cNvPr>
+          <p:cNvPicPr>
+            <a:picLocks noChangeAspect="1"/>
+          </p:cNvPicPr>
+          <p:nvPr/>
+        </p:nvPicPr>
+        <p:blipFill>
+          <a:blip r:embed="rId2"/>
+          <a:stretch>
+            <a:fillRect/>
+          </a:stretch>
+        </p:blipFill>
+        <p:spPr>
+          <a:xfrm>
+            <a:off x="838200" y="548641"/>
+            <a:ext cx="10054470" cy="5990755"/>
+          </a:xfrm>
+          <a:prstGeom prst="rect">
+            <a:avLst/>
+          </a:prstGeom>
+        </p:spPr>
+      </p:pic>
+      <p:sp>
+        <p:nvSpPr>
+          <p:cNvPr id="5" name="TextBox 4">
+            <a:extLst>
+              <a:ext uri="{FF2B5EF4-FFF2-40B4-BE49-F238E27FC236}">
+                <a16:creationId xmlns:a16="http://schemas.microsoft.com/office/drawing/2014/main" id="{C4935C57-9BCF-4CDC-A3AA-07CC3FB0EABB}"/>
+              </a:ext>
+            </a:extLst>
+          </p:cNvPr>
+          <p:cNvSpPr txBox="1"/>
+          <p:nvPr/>
+        </p:nvSpPr>
+        <p:spPr>
+          <a:xfrm>
+            <a:off x="188535" y="6441705"/>
+            <a:ext cx="11353800" cy="646331"/>
+          </a:xfrm>
+          <a:prstGeom prst="rect">
+            <a:avLst/>
+          </a:prstGeom>
+          <a:noFill/>
+        </p:spPr>
+        <p:txBody>
+          <a:bodyPr wrap="square" rtlCol="0">
+            <a:spAutoFit/>
+          </a:bodyPr>
+          <a:lstStyle/>
+          <a:p>
+            <a:r>
+              <a:rPr lang="en-IE" dirty="0"/>
+              <a:t>© Xilinx, Source: </a:t>
+            </a:r>
+            <a:r>
+              <a:rPr lang="en-IE" dirty="0">
+                <a:hlinkClick r:id="rId3"/>
+              </a:rPr>
+              <a:t>https://www.xilinx.com/support/documentation/user_guides/ug384.pdf</a:t>
+            </a:r>
+            <a:r>
+              <a:rPr lang="en-IE" dirty="0"/>
+              <a:t> </a:t>
+            </a:r>
+          </a:p>
+          <a:p>
+            <a:endParaRPr lang="en-IE" dirty="0"/>
+          </a:p>
+        </p:txBody>
+      </p:sp>
+      <p:sp>
+        <p:nvSpPr>
+          <p:cNvPr id="6" name="Oval 5">
+            <a:extLst>
+              <a:ext uri="{FF2B5EF4-FFF2-40B4-BE49-F238E27FC236}">
+                <a16:creationId xmlns:a16="http://schemas.microsoft.com/office/drawing/2014/main" id="{FE80234E-1EF0-4E41-9784-676EBD57FED6}"/>
+              </a:ext>
+            </a:extLst>
+          </p:cNvPr>
+          <p:cNvSpPr/>
+          <p:nvPr/>
+        </p:nvSpPr>
+        <p:spPr>
+          <a:xfrm>
+            <a:off x="3625327" y="839096"/>
+            <a:ext cx="2721685" cy="819375"/>
+          </a:xfrm>
+          <a:prstGeom prst="ellipse">
+            <a:avLst/>
+          </a:prstGeom>
+          <a:noFill/>
+          <a:ln w="57150">
+            <a:solidFill>
+              <a:srgbClr val="FF0000"/>
+            </a:solidFill>
+          </a:ln>
+        </p:spPr>
+        <p:style>
+          <a:lnRef idx="2">
+            <a:schemeClr val="accent1">
+              <a:shade val="50000"/>
+            </a:schemeClr>
+          </a:lnRef>
+          <a:fillRef idx="1">
+            <a:schemeClr val="accent1"/>
+          </a:fillRef>
+          <a:effectRef idx="0">
+            <a:schemeClr val="accent1"/>
+          </a:effectRef>
+          <a:fontRef idx="minor">
+            <a:schemeClr val="lt1"/>
+          </a:fontRef>
+        </p:style>
+        <p:txBody>
+          <a:bodyPr rtlCol="0" anchor="ctr"/>
+          <a:lstStyle/>
+          <a:p>
+            <a:pPr algn="ctr"/>
+            <a:endParaRPr lang="en-IE"/>
+          </a:p>
+        </p:txBody>
+      </p:sp>
+    </p:spTree>
+    <p:extLst>
+      <p:ext uri="{BB962C8B-B14F-4D97-AF65-F5344CB8AC3E}">
+        <p14:creationId xmlns:p14="http://schemas.microsoft.com/office/powerpoint/2010/main" val="236119335"/>
+      </p:ext>
+    </p:extLst>
+  </p:cSld>
+  <p:clrMapOvr>
+    <a:masterClrMapping/>
+  </p:clrMapOvr>
+</p:sld>
+</file>
+
+<file path=ppt/slides/slide62.xml><?xml version="1.0" encoding="utf-8"?>
+<p:sld xmlns:a="http://schemas.openxmlformats.org/drawingml/2006/main" xmlns:r="http://schemas.openxmlformats.org/officeDocument/2006/relationships" xmlns:p="http://schemas.openxmlformats.org/presentationml/2006/main">
+  <p:cSld>
+    <p:spTree>
+      <p:nvGrpSpPr>
+        <p:cNvPr id="1" name=""/>
+        <p:cNvGrpSpPr/>
+        <p:nvPr/>
+      </p:nvGrpSpPr>
+      <p:grpSpPr>
+        <a:xfrm>
+          <a:off x="0" y="0"/>
+          <a:ext cx="0" cy="0"/>
+          <a:chOff x="0" y="0"/>
+          <a:chExt cx="0" cy="0"/>
+        </a:xfrm>
+      </p:grpSpPr>
+      <p:sp>
+        <p:nvSpPr>
+          <p:cNvPr id="2" name="Title 1">
+            <a:extLst>
+              <a:ext uri="{FF2B5EF4-FFF2-40B4-BE49-F238E27FC236}">
+                <a16:creationId xmlns:a16="http://schemas.microsoft.com/office/drawing/2014/main" id="{0F5E4F47-9DA8-4CCF-805C-3F7A13EEE530}"/>
+              </a:ext>
+            </a:extLst>
+          </p:cNvPr>
+          <p:cNvSpPr>
+            <a:spLocks noGrp="1"/>
+          </p:cNvSpPr>
+          <p:nvPr>
+            <p:ph type="title"/>
+          </p:nvPr>
+        </p:nvSpPr>
+        <p:spPr>
+          <a:xfrm>
+            <a:off x="377070" y="1"/>
+            <a:ext cx="10515600" cy="369212"/>
+          </a:xfrm>
+        </p:spPr>
+        <p:txBody>
+          <a:bodyPr>
+            <a:noAutofit/>
+          </a:bodyPr>
+          <a:lstStyle/>
+          <a:p>
+            <a:r>
+              <a:rPr lang="en-IE" sz="3200" dirty="0"/>
+              <a:t>Xilinx Spartan 6 vs </a:t>
+            </a:r>
+            <a:r>
+              <a:rPr lang="en-IE" sz="3200" dirty="0" err="1"/>
+              <a:t>Virtex</a:t>
+            </a:r>
+            <a:r>
+              <a:rPr lang="en-IE" sz="3200" dirty="0"/>
+              <a:t> </a:t>
+            </a:r>
+            <a:r>
+              <a:rPr lang="en-IE" sz="3200" dirty="0" err="1"/>
+              <a:t>Ultrascale</a:t>
+            </a:r>
+            <a:r>
+              <a:rPr lang="en-IE" sz="3200" dirty="0"/>
+              <a:t> family  - just for scale</a:t>
+            </a:r>
+          </a:p>
+        </p:txBody>
+      </p:sp>
+      <p:sp>
+        <p:nvSpPr>
+          <p:cNvPr id="5" name="TextBox 4">
+            <a:extLst>
+              <a:ext uri="{FF2B5EF4-FFF2-40B4-BE49-F238E27FC236}">
+                <a16:creationId xmlns:a16="http://schemas.microsoft.com/office/drawing/2014/main" id="{C4935C57-9BCF-4CDC-A3AA-07CC3FB0EABB}"/>
+              </a:ext>
+            </a:extLst>
+          </p:cNvPr>
+          <p:cNvSpPr txBox="1"/>
+          <p:nvPr/>
+        </p:nvSpPr>
+        <p:spPr>
+          <a:xfrm>
+            <a:off x="188535" y="6441705"/>
+            <a:ext cx="11353800" cy="369332"/>
+          </a:xfrm>
+          <a:prstGeom prst="rect">
+            <a:avLst/>
+          </a:prstGeom>
+          <a:noFill/>
+        </p:spPr>
+        <p:txBody>
+          <a:bodyPr wrap="square" rtlCol="0">
+            <a:spAutoFit/>
+          </a:bodyPr>
+          <a:lstStyle/>
+          <a:p>
+            <a:r>
+              <a:rPr lang="en-IE" dirty="0"/>
+              <a:t>© Xilinx, Source: </a:t>
+            </a:r>
+            <a:r>
+              <a:rPr lang="en-IE" dirty="0">
+                <a:hlinkClick r:id="rId2"/>
+              </a:rPr>
+              <a:t>https://www.xilinx.com/support/documentation/data_sheets/ds890-ultrascale-overview.pdf</a:t>
+            </a:r>
+            <a:r>
+              <a:rPr lang="en-IE" dirty="0"/>
+              <a:t> </a:t>
+            </a:r>
+          </a:p>
+        </p:txBody>
+      </p:sp>
+      <p:pic>
+        <p:nvPicPr>
+          <p:cNvPr id="7" name="Picture 6">
+            <a:extLst>
+              <a:ext uri="{FF2B5EF4-FFF2-40B4-BE49-F238E27FC236}">
+                <a16:creationId xmlns:a16="http://schemas.microsoft.com/office/drawing/2014/main" id="{0CFA27EC-7063-44C6-A71D-E7E9D38FADD1}"/>
+              </a:ext>
+            </a:extLst>
+          </p:cNvPr>
+          <p:cNvPicPr>
+            <a:picLocks noChangeAspect="1"/>
+          </p:cNvPicPr>
+          <p:nvPr/>
+        </p:nvPicPr>
+        <p:blipFill>
+          <a:blip r:embed="rId3"/>
+          <a:stretch>
+            <a:fillRect/>
+          </a:stretch>
+        </p:blipFill>
+        <p:spPr>
+          <a:xfrm>
+            <a:off x="0" y="369213"/>
+            <a:ext cx="12192000" cy="6119573"/>
+          </a:xfrm>
+          <a:prstGeom prst="rect">
+            <a:avLst/>
+          </a:prstGeom>
+        </p:spPr>
+      </p:pic>
+    </p:spTree>
+    <p:extLst>
+      <p:ext uri="{BB962C8B-B14F-4D97-AF65-F5344CB8AC3E}">
+        <p14:creationId xmlns:p14="http://schemas.microsoft.com/office/powerpoint/2010/main" val="1326398291"/>
+      </p:ext>
+    </p:extLst>
+  </p:cSld>
+  <p:clrMapOvr>
+    <a:masterClrMapping/>
+  </p:clrMapOvr>
+</p:sld>
+</file>
+
+<file path=ppt/slides/slide63.xml><?xml version="1.0" encoding="utf-8"?>
+<p:sld xmlns:a="http://schemas.openxmlformats.org/drawingml/2006/main" xmlns:r="http://schemas.openxmlformats.org/officeDocument/2006/relationships" xmlns:p="http://schemas.openxmlformats.org/presentationml/2006/main">
+  <p:cSld>
+    <p:spTree>
+      <p:nvGrpSpPr>
+        <p:cNvPr id="1" name=""/>
+        <p:cNvGrpSpPr/>
+        <p:nvPr/>
+      </p:nvGrpSpPr>
+      <p:grpSpPr>
+        <a:xfrm>
+          <a:off x="0" y="0"/>
+          <a:ext cx="0" cy="0"/>
+          <a:chOff x="0" y="0"/>
+          <a:chExt cx="0" cy="0"/>
+        </a:xfrm>
+      </p:grpSpPr>
+      <p:sp>
+        <p:nvSpPr>
+          <p:cNvPr id="2" name="Title 1">
+            <a:extLst>
+              <a:ext uri="{FF2B5EF4-FFF2-40B4-BE49-F238E27FC236}">
+                <a16:creationId xmlns:a16="http://schemas.microsoft.com/office/drawing/2014/main" id="{444FC6A2-5A40-4204-A08E-B7176AFEB2AF}"/>
+              </a:ext>
+            </a:extLst>
+          </p:cNvPr>
+          <p:cNvSpPr>
+            <a:spLocks noGrp="1"/>
+          </p:cNvSpPr>
+          <p:nvPr>
+            <p:ph type="title"/>
+          </p:nvPr>
+        </p:nvSpPr>
+        <p:spPr/>
+        <p:txBody>
+          <a:bodyPr/>
+          <a:lstStyle/>
+          <a:p>
+            <a:r>
+              <a:rPr lang="en-IE" dirty="0"/>
+              <a:t>FPGA: interconnects </a:t>
+            </a:r>
+          </a:p>
+        </p:txBody>
+      </p:sp>
+      <p:sp>
+        <p:nvSpPr>
+          <p:cNvPr id="3" name="Content Placeholder 2">
+            <a:extLst>
+              <a:ext uri="{FF2B5EF4-FFF2-40B4-BE49-F238E27FC236}">
+                <a16:creationId xmlns:a16="http://schemas.microsoft.com/office/drawing/2014/main" id="{367CDD2E-9971-47D0-AC75-0D5C982FF969}"/>
+              </a:ext>
+            </a:extLst>
+          </p:cNvPr>
+          <p:cNvSpPr>
+            <a:spLocks noGrp="1"/>
+          </p:cNvSpPr>
+          <p:nvPr>
+            <p:ph idx="1"/>
+          </p:nvPr>
+        </p:nvSpPr>
+        <p:spPr/>
+        <p:txBody>
+          <a:bodyPr/>
+          <a:lstStyle/>
+          <a:p>
+            <a:endParaRPr lang="en-IE" dirty="0"/>
+          </a:p>
+        </p:txBody>
+      </p:sp>
+    </p:spTree>
+    <p:extLst>
+      <p:ext uri="{BB962C8B-B14F-4D97-AF65-F5344CB8AC3E}">
+        <p14:creationId xmlns:p14="http://schemas.microsoft.com/office/powerpoint/2010/main" val="102770265"/>
+      </p:ext>
+    </p:extLst>
+  </p:cSld>
+  <p:clrMapOvr>
+    <a:masterClrMapping/>
+  </p:clrMapOvr>
 </p:sld>
 </file>
 

</xml_diff>